<commit_message>
Update 0725 summer internship final presentation.pptx
</commit_message>
<xml_diff>
--- a/Survey meeting/인턴 발표 준비/0725 summer internship final presentation.pptx
+++ b/Survey meeting/인턴 발표 준비/0725 summer internship final presentation.pptx
@@ -5,10 +5,10 @@
     <p:sldMasterId id="2147483648" r:id="rId1"/>
   </p:sldMasterIdLst>
   <p:notesMasterIdLst>
-    <p:notesMasterId r:id="rId26"/>
+    <p:notesMasterId r:id="rId28"/>
   </p:notesMasterIdLst>
   <p:handoutMasterIdLst>
-    <p:handoutMasterId r:id="rId27"/>
+    <p:handoutMasterId r:id="rId29"/>
   </p:handoutMasterIdLst>
   <p:sldIdLst>
     <p:sldId id="1055" r:id="rId2"/>
@@ -30,16 +30,18 @@
     <p:sldId id="1374" r:id="rId18"/>
     <p:sldId id="1405" r:id="rId19"/>
     <p:sldId id="1451" r:id="rId20"/>
-    <p:sldId id="1452" r:id="rId21"/>
-    <p:sldId id="1455" r:id="rId22"/>
-    <p:sldId id="1447" r:id="rId23"/>
-    <p:sldId id="1386" r:id="rId24"/>
-    <p:sldId id="1202" r:id="rId25"/>
+    <p:sldId id="1457" r:id="rId21"/>
+    <p:sldId id="1452" r:id="rId22"/>
+    <p:sldId id="1455" r:id="rId23"/>
+    <p:sldId id="1456" r:id="rId24"/>
+    <p:sldId id="1447" r:id="rId25"/>
+    <p:sldId id="1386" r:id="rId26"/>
+    <p:sldId id="1202" r:id="rId27"/>
   </p:sldIdLst>
   <p:sldSz cx="9144000" cy="6858000" type="screen4x3"/>
   <p:notesSz cx="6805613" cy="9939338"/>
   <p:custDataLst>
-    <p:tags r:id="rId28"/>
+    <p:tags r:id="rId30"/>
   </p:custDataLst>
   <p:defaultTextStyle>
     <a:defPPr>
@@ -265,7 +267,7 @@
           <a:p>
             <a:fld id="{CA9481DB-C454-F848-85FD-7531C4681FA8}" type="datetimeFigureOut">
               <a:rPr lang="en-US" smtClean="0"/>
-              <a:t>7/24/2019</a:t>
+              <a:t>7/25/2019</a:t>
             </a:fld>
             <a:endParaRPr lang="en-US"/>
           </a:p>
@@ -431,7 +433,7 @@
           <a:p>
             <a:fld id="{4915021A-BD82-6549-B6F0-C141B99A7573}" type="datetimeFigureOut">
               <a:rPr lang="en-US" smtClean="0"/>
-              <a:t>7/24/2019</a:t>
+              <a:t>7/25/2019</a:t>
             </a:fld>
             <a:endParaRPr lang="en-US"/>
           </a:p>
@@ -1033,7 +1035,7 @@
     </p:spTree>
     <p:extLst>
       <p:ext uri="{BB962C8B-B14F-4D97-AF65-F5344CB8AC3E}">
-        <p14:creationId xmlns:p14="http://schemas.microsoft.com/office/powerpoint/2010/main" val="820956159"/>
+        <p14:creationId xmlns:p14="http://schemas.microsoft.com/office/powerpoint/2010/main" val="4041932477"/>
       </p:ext>
     </p:extLst>
   </p:cSld>
@@ -1117,6 +1119,90 @@
     </p:spTree>
     <p:extLst>
       <p:ext uri="{BB962C8B-B14F-4D97-AF65-F5344CB8AC3E}">
+        <p14:creationId xmlns:p14="http://schemas.microsoft.com/office/powerpoint/2010/main" val="820956159"/>
+      </p:ext>
+    </p:extLst>
+  </p:cSld>
+  <p:clrMapOvr>
+    <a:masterClrMapping/>
+  </p:clrMapOvr>
+</p:notes>
+</file>
+
+<file path=ppt/notesSlides/notesSlide14.xml><?xml version="1.0" encoding="utf-8"?>
+<p:notes xmlns:a="http://schemas.openxmlformats.org/drawingml/2006/main" xmlns:r="http://schemas.openxmlformats.org/officeDocument/2006/relationships" xmlns:p="http://schemas.openxmlformats.org/presentationml/2006/main">
+  <p:cSld>
+    <p:spTree>
+      <p:nvGrpSpPr>
+        <p:cNvPr id="1" name=""/>
+        <p:cNvGrpSpPr/>
+        <p:nvPr/>
+      </p:nvGrpSpPr>
+      <p:grpSpPr>
+        <a:xfrm>
+          <a:off x="0" y="0"/>
+          <a:ext cx="0" cy="0"/>
+          <a:chOff x="0" y="0"/>
+          <a:chExt cx="0" cy="0"/>
+        </a:xfrm>
+      </p:grpSpPr>
+      <p:sp>
+        <p:nvSpPr>
+          <p:cNvPr id="2" name="슬라이드 이미지 개체 틀 1"/>
+          <p:cNvSpPr>
+            <a:spLocks noGrp="1" noRot="1" noChangeAspect="1"/>
+          </p:cNvSpPr>
+          <p:nvPr>
+            <p:ph type="sldImg"/>
+          </p:nvPr>
+        </p:nvSpPr>
+        <p:spPr/>
+      </p:sp>
+      <p:sp>
+        <p:nvSpPr>
+          <p:cNvPr id="3" name="슬라이드 노트 개체 틀 2"/>
+          <p:cNvSpPr>
+            <a:spLocks noGrp="1"/>
+          </p:cNvSpPr>
+          <p:nvPr>
+            <p:ph type="body" idx="1"/>
+          </p:nvPr>
+        </p:nvSpPr>
+        <p:spPr/>
+        <p:txBody>
+          <a:bodyPr/>
+          <a:lstStyle/>
+          <a:p>
+            <a:endParaRPr lang="ko-KR" altLang="en-US" dirty="0"/>
+          </a:p>
+        </p:txBody>
+      </p:sp>
+      <p:sp>
+        <p:nvSpPr>
+          <p:cNvPr id="4" name="슬라이드 번호 개체 틀 3"/>
+          <p:cNvSpPr>
+            <a:spLocks noGrp="1"/>
+          </p:cNvSpPr>
+          <p:nvPr>
+            <p:ph type="sldNum" sz="quarter" idx="10"/>
+          </p:nvPr>
+        </p:nvSpPr>
+        <p:spPr/>
+        <p:txBody>
+          <a:bodyPr/>
+          <a:lstStyle/>
+          <a:p>
+            <a:fld id="{B98F8F32-8FB8-B84B-82B3-E896E2106CA1}" type="slidenum">
+              <a:rPr lang="en-US" smtClean="0"/>
+              <a:t>22</a:t>
+            </a:fld>
+            <a:endParaRPr lang="en-US" dirty="0"/>
+          </a:p>
+        </p:txBody>
+      </p:sp>
+    </p:spTree>
+    <p:extLst>
+      <p:ext uri="{BB962C8B-B14F-4D97-AF65-F5344CB8AC3E}">
         <p14:creationId xmlns:p14="http://schemas.microsoft.com/office/powerpoint/2010/main" val="1470443353"/>
       </p:ext>
     </p:extLst>
@@ -1127,7 +1213,91 @@
 </p:notes>
 </file>
 
-<file path=ppt/notesSlides/notesSlide14.xml><?xml version="1.0" encoding="utf-8"?>
+<file path=ppt/notesSlides/notesSlide15.xml><?xml version="1.0" encoding="utf-8"?>
+<p:notes xmlns:a="http://schemas.openxmlformats.org/drawingml/2006/main" xmlns:r="http://schemas.openxmlformats.org/officeDocument/2006/relationships" xmlns:p="http://schemas.openxmlformats.org/presentationml/2006/main">
+  <p:cSld>
+    <p:spTree>
+      <p:nvGrpSpPr>
+        <p:cNvPr id="1" name=""/>
+        <p:cNvGrpSpPr/>
+        <p:nvPr/>
+      </p:nvGrpSpPr>
+      <p:grpSpPr>
+        <a:xfrm>
+          <a:off x="0" y="0"/>
+          <a:ext cx="0" cy="0"/>
+          <a:chOff x="0" y="0"/>
+          <a:chExt cx="0" cy="0"/>
+        </a:xfrm>
+      </p:grpSpPr>
+      <p:sp>
+        <p:nvSpPr>
+          <p:cNvPr id="2" name="슬라이드 이미지 개체 틀 1"/>
+          <p:cNvSpPr>
+            <a:spLocks noGrp="1" noRot="1" noChangeAspect="1"/>
+          </p:cNvSpPr>
+          <p:nvPr>
+            <p:ph type="sldImg"/>
+          </p:nvPr>
+        </p:nvSpPr>
+        <p:spPr/>
+      </p:sp>
+      <p:sp>
+        <p:nvSpPr>
+          <p:cNvPr id="3" name="슬라이드 노트 개체 틀 2"/>
+          <p:cNvSpPr>
+            <a:spLocks noGrp="1"/>
+          </p:cNvSpPr>
+          <p:nvPr>
+            <p:ph type="body" idx="1"/>
+          </p:nvPr>
+        </p:nvSpPr>
+        <p:spPr/>
+        <p:txBody>
+          <a:bodyPr/>
+          <a:lstStyle/>
+          <a:p>
+            <a:endParaRPr lang="ko-KR" altLang="en-US" dirty="0"/>
+          </a:p>
+        </p:txBody>
+      </p:sp>
+      <p:sp>
+        <p:nvSpPr>
+          <p:cNvPr id="4" name="슬라이드 번호 개체 틀 3"/>
+          <p:cNvSpPr>
+            <a:spLocks noGrp="1"/>
+          </p:cNvSpPr>
+          <p:nvPr>
+            <p:ph type="sldNum" sz="quarter" idx="10"/>
+          </p:nvPr>
+        </p:nvSpPr>
+        <p:spPr/>
+        <p:txBody>
+          <a:bodyPr/>
+          <a:lstStyle/>
+          <a:p>
+            <a:fld id="{B98F8F32-8FB8-B84B-82B3-E896E2106CA1}" type="slidenum">
+              <a:rPr lang="en-US" smtClean="0"/>
+              <a:t>23</a:t>
+            </a:fld>
+            <a:endParaRPr lang="en-US" dirty="0"/>
+          </a:p>
+        </p:txBody>
+      </p:sp>
+    </p:spTree>
+    <p:extLst>
+      <p:ext uri="{BB962C8B-B14F-4D97-AF65-F5344CB8AC3E}">
+        <p14:creationId xmlns:p14="http://schemas.microsoft.com/office/powerpoint/2010/main" val="2483491882"/>
+      </p:ext>
+    </p:extLst>
+  </p:cSld>
+  <p:clrMapOvr>
+    <a:masterClrMapping/>
+  </p:clrMapOvr>
+</p:notes>
+</file>
+
+<file path=ppt/notesSlides/notesSlide16.xml><?xml version="1.0" encoding="utf-8"?>
 <p:notes xmlns:a="http://schemas.openxmlformats.org/drawingml/2006/main" xmlns:r="http://schemas.openxmlformats.org/officeDocument/2006/relationships" xmlns:p="http://schemas.openxmlformats.org/presentationml/2006/main">
   <p:cSld>
     <p:spTree>
@@ -1198,7 +1368,7 @@
                 <a:latin typeface="Calibri"/>
               </a:rPr>
               <a:pPr/>
-              <a:t>22</a:t>
+              <a:t>24</a:t>
             </a:fld>
             <a:endParaRPr lang="en-US">
               <a:solidFill>
@@ -7479,11 +7649,21 @@
                   <a:rPr lang="en-US" altLang="ko-KR" dirty="0"/>
                   <a:t> lib.</a:t>
                 </a:r>
-                <a:endParaRPr lang="en-US" altLang="ko-KR" dirty="0">
-                  <a:solidFill>
-                    <a:schemeClr val="tx1"/>
-                  </a:solidFill>
-                </a:endParaRPr>
+              </a:p>
+              <a:p>
+                <a:pPr>
+                  <a:lnSpc>
+                    <a:spcPct val="150000"/>
+                  </a:lnSpc>
+                </a:pPr>
+                <a:r>
+                  <a:rPr lang="en-US" altLang="ko-KR" dirty="0">
+                    <a:solidFill>
+                      <a:schemeClr val="tx1"/>
+                    </a:solidFill>
+                  </a:rPr>
+                  <a:t>Use DQN algorithm</a:t>
+                </a:r>
               </a:p>
               <a:p>
                 <a:pPr lvl="1" latinLnBrk="1">
@@ -7505,7 +7685,23 @@
                       <a:schemeClr val="tx1"/>
                     </a:solidFill>
                   </a:rPr>
-                  <a:t>: Matrix of UE position [UE x position, UE y position]</a:t>
+                  <a:t>: Matrix of </a:t>
+                </a:r>
+                <a:r>
+                  <a:rPr lang="en-US" altLang="ko-KR" dirty="0">
+                    <a:solidFill>
+                      <a:srgbClr val="FF0000"/>
+                    </a:solidFill>
+                  </a:rPr>
+                  <a:t>UE position </a:t>
+                </a:r>
+                <a:r>
+                  <a:rPr lang="en-US" altLang="ko-KR" dirty="0">
+                    <a:solidFill>
+                      <a:schemeClr val="tx1"/>
+                    </a:solidFill>
+                  </a:rPr>
+                  <a:t>[UE x position, UE y position]</a:t>
                 </a:r>
               </a:p>
               <a:p>
@@ -7528,7 +7724,31 @@
                       <a:schemeClr val="tx1"/>
                     </a:solidFill>
                   </a:rPr>
-                  <a:t>: Change each BS on/off state, discrete</a:t>
+                  <a:t>: Changing each </a:t>
+                </a:r>
+                <a:r>
+                  <a:rPr lang="en-US" altLang="ko-KR" dirty="0">
+                    <a:solidFill>
+                      <a:srgbClr val="FF0000"/>
+                    </a:solidFill>
+                  </a:rPr>
+                  <a:t>BS on/off </a:t>
+                </a:r>
+                <a:r>
+                  <a:rPr lang="en-US" altLang="ko-KR" dirty="0">
+                    <a:solidFill>
+                      <a:schemeClr val="tx1"/>
+                    </a:solidFill>
+                  </a:rPr>
+                  <a:t>state, </a:t>
+                </a:r>
+                <a:r>
+                  <a:rPr lang="en-US" altLang="ko-KR" dirty="0">
+                    <a:solidFill>
+                      <a:srgbClr val="0000FF"/>
+                    </a:solidFill>
+                  </a:rPr>
+                  <a:t>discrete</a:t>
                 </a:r>
               </a:p>
               <a:p>
@@ -7648,7 +7868,7 @@
                     <m:f>
                       <m:fPr>
                         <m:ctrlPr>
-                          <a:rPr lang="en-US" altLang="ko-KR" b="0" smtClean="0">
+                          <a:rPr lang="en-US" altLang="ko-KR" b="0" i="1" smtClean="0">
                             <a:solidFill>
                               <a:schemeClr val="tx1"/>
                             </a:solidFill>
@@ -7898,7 +8118,7 @@
         </p:nvSpPr>
         <p:spPr>
           <a:xfrm rot="16200000" flipH="1">
-            <a:off x="4913435" y="3672250"/>
+            <a:off x="4913437" y="4257048"/>
             <a:ext cx="130628" cy="813497"/>
           </a:xfrm>
           <a:prstGeom prst="rightBrace">
@@ -7947,7 +8167,7 @@
             </p:nvSpPr>
             <p:spPr>
               <a:xfrm>
-                <a:off x="4677893" y="4165579"/>
+                <a:off x="4677895" y="4729111"/>
                 <a:ext cx="601712" cy="307907"/>
               </a:xfrm>
               <a:prstGeom prst="rect">
@@ -7982,6 +8202,7 @@
                 </a:lvl1pPr>
               </a:lstStyle>
               <a:p>
+                <a:pPr/>
                 <a14:m>
                   <m:oMathPara xmlns:m="http://schemas.openxmlformats.org/officeDocument/2006/math">
                     <m:oMathParaPr>
@@ -8041,7 +8262,7 @@
             </p:nvSpPr>
             <p:spPr>
               <a:xfrm>
-                <a:off x="4677893" y="4165579"/>
+                <a:off x="4677895" y="4729111"/>
                 <a:ext cx="601712" cy="307907"/>
               </a:xfrm>
               <a:prstGeom prst="rect">
@@ -8098,7 +8319,7 @@
         </p:blipFill>
         <p:spPr>
           <a:xfrm>
-            <a:off x="7304658" y="2105807"/>
+            <a:off x="7442881" y="2764624"/>
             <a:ext cx="1152525" cy="1971675"/>
           </a:xfrm>
           <a:prstGeom prst="rect">
@@ -8200,24 +8421,6 @@
               </a:bodyPr>
               <a:lstStyle/>
               <a:p>
-                <a:r>
-                  <a:rPr lang="en-US" altLang="ko-KR" dirty="0">
-                    <a:solidFill>
-                      <a:schemeClr val="tx1"/>
-                    </a:solidFill>
-                  </a:rPr>
-                  <a:t>Use DQN algorithm</a:t>
-                </a:r>
-              </a:p>
-              <a:p>
-                <a:r>
-                  <a:rPr lang="en-US" altLang="ko-KR" dirty="0">
-                    <a:solidFill>
-                      <a:schemeClr val="tx1"/>
-                    </a:solidFill>
-                  </a:rPr>
-                  <a:t>Use </a:t>
-                </a:r>
                 <a14:m>
                   <m:oMath xmlns:m="http://schemas.openxmlformats.org/officeDocument/2006/math">
                     <m:r>
@@ -8225,6 +8428,7 @@
                         <a:solidFill>
                           <a:schemeClr val="tx1"/>
                         </a:solidFill>
+                        <a:latin typeface="Cambria Math" panose="02040503050406030204" pitchFamily="18" charset="0"/>
                       </a:rPr>
                       <m:t>𝜖</m:t>
                     </m:r>
@@ -8248,6 +8452,7 @@
                         <a:solidFill>
                           <a:schemeClr val="tx1"/>
                         </a:solidFill>
+                        <a:latin typeface="Cambria Math" panose="02040503050406030204" pitchFamily="18" charset="0"/>
                       </a:rPr>
                       <m:t>𝜖</m:t>
                     </m:r>
@@ -8259,7 +8464,23 @@
                       <a:schemeClr val="tx1"/>
                     </a:solidFill>
                   </a:rPr>
-                  <a:t> decays linearly from 0.99 to 0 based on # of episodes</a:t>
+                  <a:t> </a:t>
+                </a:r>
+                <a:r>
+                  <a:rPr lang="en-US" altLang="ko-KR" dirty="0">
+                    <a:solidFill>
+                      <a:srgbClr val="0000FF"/>
+                    </a:solidFill>
+                  </a:rPr>
+                  <a:t>decays linearly </a:t>
+                </a:r>
+                <a:r>
+                  <a:rPr lang="en-US" altLang="ko-KR" dirty="0">
+                    <a:solidFill>
+                      <a:schemeClr val="tx1"/>
+                    </a:solidFill>
+                  </a:rPr>
+                  <a:t>from 0.99 to 0 based on # of episodes</a:t>
                 </a:r>
               </a:p>
               <a:p>
@@ -8282,7 +8503,7 @@
                 <a:r>
                   <a:rPr lang="en-US" altLang="ko-KR" dirty="0">
                     <a:solidFill>
-                      <a:schemeClr val="tx1"/>
+                      <a:srgbClr val="0000FF"/>
                     </a:solidFill>
                   </a:rPr>
                   <a:t>mini</a:t>
@@ -8290,7 +8511,7 @@
                 <a:r>
                   <a:rPr lang="ko-KR" altLang="en-US" dirty="0">
                     <a:solidFill>
-                      <a:schemeClr val="tx1"/>
+                      <a:srgbClr val="0000FF"/>
                     </a:solidFill>
                   </a:rPr>
                   <a:t> </a:t>
@@ -8298,7 +8519,7 @@
                 <a:r>
                   <a:rPr lang="en-US" altLang="ko-KR" dirty="0">
                     <a:solidFill>
-                      <a:schemeClr val="tx1"/>
+                      <a:srgbClr val="0000FF"/>
                     </a:solidFill>
                   </a:rPr>
                   <a:t>batch</a:t>
@@ -8312,8 +8533,27 @@
                       <a:schemeClr val="tx1"/>
                     </a:solidFill>
                   </a:rPr>
-                  <a:t>Buffer size = 50000, FIFO, </a:t>
+                  <a:t>Buffer </a:t>
                 </a:r>
+                <a:r>
+                  <a:rPr lang="en-US" altLang="ko-KR" dirty="0" err="1">
+                    <a:solidFill>
+                      <a:schemeClr val="tx1"/>
+                    </a:solidFill>
+                  </a:rPr>
+                  <a:t>sizelimit</a:t>
+                </a:r>
+                <a:r>
+                  <a:rPr lang="en-US" altLang="ko-KR" dirty="0">
+                    <a:solidFill>
+                      <a:schemeClr val="tx1"/>
+                    </a:solidFill>
+                  </a:rPr>
+                  <a:t> = 50000, FIFO</a:t>
+                </a:r>
+              </a:p>
+              <a:p>
+                <a:pPr lvl="1"/>
                 <a:r>
                   <a:rPr lang="en-US" altLang="ko-KR" dirty="0" err="1">
                     <a:solidFill>
@@ -8328,7 +8568,7 @@
                       <a:schemeClr val="tx1"/>
                     </a:solidFill>
                   </a:rPr>
-                  <a:t>= 64</a:t>
+                  <a:t>= 1024</a:t>
                 </a:r>
               </a:p>
               <a:p>
@@ -8338,7 +8578,23 @@
                       <a:schemeClr val="tx1"/>
                     </a:solidFill>
                   </a:rPr>
-                  <a:t>Use TD(0), </a:t>
+                  <a:t>Use </a:t>
+                </a:r>
+                <a:r>
+                  <a:rPr lang="en-US" altLang="ko-KR" dirty="0">
+                    <a:solidFill>
+                      <a:srgbClr val="0000FF"/>
+                    </a:solidFill>
+                  </a:rPr>
+                  <a:t>TD(0)</a:t>
+                </a:r>
+                <a:r>
+                  <a:rPr lang="en-US" altLang="ko-KR" dirty="0">
+                    <a:solidFill>
+                      <a:schemeClr val="tx1"/>
+                    </a:solidFill>
+                  </a:rPr>
+                  <a:t>, </a:t>
                 </a:r>
                 <a14:m>
                   <m:oMath xmlns:m="http://schemas.openxmlformats.org/officeDocument/2006/math">
@@ -8527,11 +8783,32 @@
                     </m:sSub>
                   </m:oMath>
                 </a14:m>
-                <a:endParaRPr lang="en-US" altLang="ko-KR" dirty="0">
-                  <a:solidFill>
-                    <a:schemeClr val="tx1"/>
-                  </a:solidFill>
-                </a:endParaRPr>
+                <a:r>
+                  <a:rPr lang="en-US" altLang="ko-KR" dirty="0">
+                    <a:solidFill>
+                      <a:schemeClr val="tx1"/>
+                    </a:solidFill>
+                  </a:rPr>
+                  <a:t> (</a:t>
+                </a:r>
+                <a14:m>
+                  <m:oMath xmlns:m="http://schemas.openxmlformats.org/officeDocument/2006/math">
+                    <m:r>
+                      <a:rPr lang="en-US" altLang="ko-KR" i="1">
+                        <a:latin typeface="Cambria Math" panose="02040503050406030204" pitchFamily="18" charset="0"/>
+                      </a:rPr>
+                      <m:t>𝛾</m:t>
+                    </m:r>
+                  </m:oMath>
+                </a14:m>
+                <a:r>
+                  <a:rPr lang="en-US" altLang="ko-KR" dirty="0">
+                    <a:solidFill>
+                      <a:schemeClr val="tx1"/>
+                    </a:solidFill>
+                  </a:rPr>
+                  <a:t>=0.99)</a:t>
+                </a:r>
               </a:p>
               <a:p>
                 <a:r>
@@ -8540,7 +8817,15 @@
                       <a:schemeClr val="tx1"/>
                     </a:solidFill>
                   </a:rPr>
-                  <a:t>Use q-target network</a:t>
+                  <a:t>Use </a:t>
+                </a:r>
+                <a:r>
+                  <a:rPr lang="en-US" altLang="ko-KR" dirty="0">
+                    <a:solidFill>
+                      <a:srgbClr val="0000FF"/>
+                    </a:solidFill>
+                  </a:rPr>
+                  <a:t>q-target network</a:t>
                 </a:r>
               </a:p>
               <a:p>
@@ -8551,7 +8836,15 @@
                       <a:schemeClr val="tx1"/>
                     </a:solidFill>
                   </a:rPr>
-                  <a:t>Could stabilize target value</a:t>
+                  <a:t>Could </a:t>
+                </a:r>
+                <a:r>
+                  <a:rPr lang="en-US" altLang="ko-KR" dirty="0">
+                    <a:solidFill>
+                      <a:srgbClr val="FF0000"/>
+                    </a:solidFill>
+                  </a:rPr>
+                  <a:t>stabilize target value</a:t>
                 </a:r>
               </a:p>
             </p:txBody>
@@ -8738,10 +9031,18 @@
                 <a:r>
                   <a:rPr lang="en-US" altLang="ko-KR" dirty="0">
                     <a:solidFill>
+                      <a:srgbClr val="0000FF"/>
+                    </a:solidFill>
+                  </a:rPr>
+                  <a:t>Neural network</a:t>
+                </a:r>
+                <a:r>
+                  <a:rPr lang="en-US" altLang="ko-KR" dirty="0">
+                    <a:solidFill>
                       <a:schemeClr val="tx1"/>
                     </a:solidFill>
                   </a:rPr>
-                  <a:t>Neural network design</a:t>
+                  <a:t> design</a:t>
                 </a:r>
               </a:p>
               <a:p>
@@ -8752,7 +9053,15 @@
                       <a:schemeClr val="tx1"/>
                     </a:solidFill>
                   </a:rPr>
-                  <a:t>Use fully connected network</a:t>
+                  <a:t>Use </a:t>
+                </a:r>
+                <a:r>
+                  <a:rPr lang="en-US" altLang="ko-KR" dirty="0">
+                    <a:solidFill>
+                      <a:srgbClr val="0000FF"/>
+                    </a:solidFill>
+                  </a:rPr>
+                  <a:t>fully connected network</a:t>
                 </a:r>
               </a:p>
               <a:p>
@@ -8763,7 +9072,23 @@
                       <a:schemeClr val="tx1"/>
                     </a:solidFill>
                   </a:rPr>
-                  <a:t># of input nodes is dimension of state, which is </a:t>
+                  <a:t># of </a:t>
+                </a:r>
+                <a:r>
+                  <a:rPr lang="en-US" altLang="ko-KR" dirty="0">
+                    <a:solidFill>
+                      <a:srgbClr val="FF0000"/>
+                    </a:solidFill>
+                  </a:rPr>
+                  <a:t>input nodes </a:t>
+                </a:r>
+                <a:r>
+                  <a:rPr lang="en-US" altLang="ko-KR" dirty="0">
+                    <a:solidFill>
+                      <a:schemeClr val="tx1"/>
+                    </a:solidFill>
+                  </a:rPr>
+                  <a:t>is dimension of state, which is </a:t>
                 </a:r>
                 <a14:m>
                   <m:oMath xmlns:m="http://schemas.openxmlformats.org/officeDocument/2006/math">
@@ -8831,7 +9156,23 @@
                       <a:schemeClr val="tx1"/>
                     </a:solidFill>
                   </a:rPr>
-                  <a:t># of hidden layer nodes is 100 each, has 2 hidden layer</a:t>
+                  <a:t># of </a:t>
+                </a:r>
+                <a:r>
+                  <a:rPr lang="en-US" altLang="ko-KR" dirty="0">
+                    <a:solidFill>
+                      <a:srgbClr val="FF0000"/>
+                    </a:solidFill>
+                  </a:rPr>
+                  <a:t>hidden layer nodes </a:t>
+                </a:r>
+                <a:r>
+                  <a:rPr lang="en-US" altLang="ko-KR" dirty="0">
+                    <a:solidFill>
+                      <a:schemeClr val="tx1"/>
+                    </a:solidFill>
+                  </a:rPr>
+                  <a:t>is 100 each, has 2 hidden layer</a:t>
                 </a:r>
               </a:p>
               <a:p>
@@ -8842,7 +9183,23 @@
                       <a:schemeClr val="tx1"/>
                     </a:solidFill>
                   </a:rPr>
-                  <a:t># of output nodes is dimension of possible actions, which is </a:t>
+                  <a:t># of </a:t>
+                </a:r>
+                <a:r>
+                  <a:rPr lang="en-US" altLang="ko-KR" dirty="0">
+                    <a:solidFill>
+                      <a:srgbClr val="FF0000"/>
+                    </a:solidFill>
+                  </a:rPr>
+                  <a:t>output nodes </a:t>
+                </a:r>
+                <a:r>
+                  <a:rPr lang="en-US" altLang="ko-KR" dirty="0">
+                    <a:solidFill>
+                      <a:schemeClr val="tx1"/>
+                    </a:solidFill>
+                  </a:rPr>
+                  <a:t>is dimension of possible actions, which is </a:t>
                 </a:r>
                 <a14:m>
                   <m:oMath xmlns:m="http://schemas.openxmlformats.org/officeDocument/2006/math">
@@ -9402,8 +9759,8 @@
             </a:p>
           </p:txBody>
         </p:sp>
-        <mc:AlternateContent xmlns:mc="http://schemas.openxmlformats.org/markup-compatibility/2006">
-          <mc:Choice xmlns:a14="http://schemas.microsoft.com/office/drawing/2010/main" Requires="a14">
+        <mc:AlternateContent xmlns:mc="http://schemas.openxmlformats.org/markup-compatibility/2006" xmlns:a14="http://schemas.microsoft.com/office/drawing/2010/main">
+          <mc:Choice Requires="a14">
             <p:sp>
               <p:nvSpPr>
                 <p:cNvPr id="18" name="TextBox 17">
@@ -9474,7 +9831,7 @@
               </p:txBody>
             </p:sp>
           </mc:Choice>
-          <mc:Fallback>
+          <mc:Fallback xmlns="">
             <p:sp>
               <p:nvSpPr>
                 <p:cNvPr id="18" name="TextBox 17">
@@ -9726,64 +10083,64 @@
                   <a:schemeClr val="tx1"/>
                 </a:solidFill>
               </a:rPr>
-              <a:t>main.py: </a:t>
-            </a:r>
-            <a:r>
-              <a:rPr lang="en-US" altLang="ko-KR" dirty="0" err="1">
+              <a:t>main.py: DQN algorithm code</a:t>
+            </a:r>
+          </a:p>
+          <a:p>
+            <a:pPr lvl="1"/>
+            <a:endParaRPr lang="en-US" altLang="ko-KR" dirty="0">
+              <a:solidFill>
+                <a:schemeClr val="tx1"/>
+              </a:solidFill>
+            </a:endParaRPr>
+          </a:p>
+          <a:p>
+            <a:pPr lvl="1"/>
+            <a:r>
+              <a:rPr lang="en-US" altLang="ko-KR" dirty="0">
                 <a:solidFill>
                   <a:schemeClr val="tx1"/>
                 </a:solidFill>
               </a:rPr>
-              <a:t>UDNEnv</a:t>
-            </a:r>
+              <a:t>UDN_env.py: gym environment</a:t>
+            </a:r>
+          </a:p>
+          <a:p>
+            <a:pPr lvl="1"/>
+            <a:endParaRPr lang="en-US" altLang="ko-KR" dirty="0">
+              <a:solidFill>
+                <a:schemeClr val="tx1"/>
+              </a:solidFill>
+            </a:endParaRPr>
+          </a:p>
+          <a:p>
+            <a:pPr lvl="1"/>
             <a:r>
               <a:rPr lang="en-US" altLang="ko-KR" dirty="0">
                 <a:solidFill>
                   <a:schemeClr val="tx1"/>
                 </a:solidFill>
               </a:rPr>
-              <a:t>(environment code)+MCTS(RL code)</a:t>
+              <a:t>BSppp.py: create BSposition.csv (information of BS position)</a:t>
             </a:r>
           </a:p>
           <a:p>
             <a:pPr lvl="1"/>
+            <a:endParaRPr lang="en-US" altLang="ko-KR" dirty="0">
+              <a:solidFill>
+                <a:schemeClr val="tx1"/>
+              </a:solidFill>
+            </a:endParaRPr>
+          </a:p>
+          <a:p>
+            <a:pPr lvl="1"/>
             <a:r>
               <a:rPr lang="en-US" altLang="ko-KR" dirty="0">
                 <a:solidFill>
                   <a:schemeClr val="tx1"/>
                 </a:solidFill>
               </a:rPr>
-              <a:t>UDN_env.py</a:t>
-            </a:r>
-          </a:p>
-          <a:p>
-            <a:pPr lvl="1"/>
-            <a:r>
-              <a:rPr lang="en-US" altLang="ko-KR" dirty="0">
-                <a:solidFill>
-                  <a:schemeClr val="tx1"/>
-                </a:solidFill>
-              </a:rPr>
-              <a:t>BSppp.py: create BSposition.csv(information of BS position)</a:t>
-            </a:r>
-          </a:p>
-          <a:p>
-            <a:pPr lvl="1"/>
-            <a:r>
-              <a:rPr lang="en-US" altLang="ko-KR" dirty="0">
-                <a:solidFill>
-                  <a:schemeClr val="tx1"/>
-                </a:solidFill>
-              </a:rPr>
-              <a:t>InterferenceBSppp.py: create </a:t>
-            </a:r>
-            <a:r>
-              <a:rPr lang="en-US" altLang="ko-KR" dirty="0" err="1">
-                <a:solidFill>
-                  <a:schemeClr val="tx1"/>
-                </a:solidFill>
-              </a:rPr>
-              <a:t>InterferenceBSposition</a:t>
+              <a:t>InterferenceBSppp.py: create InterferenceBSposition.csv</a:t>
             </a:r>
             <a:endParaRPr lang="en-US" altLang="ko-KR" dirty="0"/>
           </a:p>
@@ -10602,8 +10959,8 @@
           </a:p>
         </p:txBody>
       </p:sp>
-      <mc:AlternateContent xmlns:mc="http://schemas.openxmlformats.org/markup-compatibility/2006">
-        <mc:Choice xmlns:a14="http://schemas.microsoft.com/office/drawing/2010/main" Requires="a14">
+      <mc:AlternateContent xmlns:mc="http://schemas.openxmlformats.org/markup-compatibility/2006" xmlns:a14="http://schemas.microsoft.com/office/drawing/2010/main">
+        <mc:Choice Requires="a14">
           <p:sp>
             <p:nvSpPr>
               <p:cNvPr id="79" name="모서리가 둥근 직사각형 78"/>
@@ -10668,7 +11025,7 @@
             </p:txBody>
           </p:sp>
         </mc:Choice>
-        <mc:Fallback>
+        <mc:Fallback xmlns="">
           <p:sp>
             <p:nvSpPr>
               <p:cNvPr id="79" name="모서리가 둥근 직사각형 78"/>
@@ -10707,8 +11064,8 @@
           </p:sp>
         </mc:Fallback>
       </mc:AlternateContent>
-      <mc:AlternateContent xmlns:mc="http://schemas.openxmlformats.org/markup-compatibility/2006">
-        <mc:Choice xmlns:a14="http://schemas.microsoft.com/office/drawing/2010/main" Requires="a14">
+      <mc:AlternateContent xmlns:mc="http://schemas.openxmlformats.org/markup-compatibility/2006" xmlns:a14="http://schemas.microsoft.com/office/drawing/2010/main">
+        <mc:Choice Requires="a14">
           <p:sp>
             <p:nvSpPr>
               <p:cNvPr id="80" name="모서리가 둥근 직사각형 79"/>
@@ -10754,7 +11111,7 @@
                         <m:begChr m:val="{"/>
                         <m:endChr m:val="}"/>
                         <m:ctrlPr>
-                          <a:rPr lang="en-US" altLang="ko-KR" b="0" i="0" smtClean="0">
+                          <a:rPr lang="en-US" altLang="ko-KR" b="0" i="1" smtClean="0">
                             <a:latin typeface="Cambria Math" panose="02040503050406030204" pitchFamily="18" charset="0"/>
                           </a:rPr>
                         </m:ctrlPr>
@@ -11036,7 +11393,7 @@
             </p:txBody>
           </p:sp>
         </mc:Choice>
-        <mc:Fallback>
+        <mc:Fallback xmlns="">
           <p:sp>
             <p:nvSpPr>
               <p:cNvPr id="80" name="모서리가 둥근 직사각형 79"/>
@@ -12851,7 +13208,7 @@
                 <a:latin typeface="Calibri"/>
                 <a:ea typeface="맑은 고딕" panose="020B0503020000020004" pitchFamily="50" charset="-127"/>
               </a:rPr>
-              <a:t>Ueposition</a:t>
+              <a:t>UEposition</a:t>
             </a:r>
             <a:r>
               <a:rPr lang="en-US" altLang="ko-KR" dirty="0">
@@ -13562,6 +13919,151 @@
           <a:chExt cx="0" cy="0"/>
         </a:xfrm>
       </p:grpSpPr>
+      <p:pic>
+        <p:nvPicPr>
+          <p:cNvPr id="1026" name="Picture 2" descr="https://media.discordapp.net/attachments/595510803923337227/603748272523182100/5_Figure_1.png">
+            <a:extLst>
+              <a:ext uri="{FF2B5EF4-FFF2-40B4-BE49-F238E27FC236}">
+                <a16:creationId xmlns:a16="http://schemas.microsoft.com/office/drawing/2014/main" id="{C70032D9-4D84-430C-AE6C-5C2514CB4BF4}"/>
+              </a:ext>
+            </a:extLst>
+          </p:cNvPr>
+          <p:cNvPicPr>
+            <a:picLocks noChangeAspect="1" noChangeArrowheads="1"/>
+          </p:cNvPicPr>
+          <p:nvPr/>
+        </p:nvPicPr>
+        <p:blipFill>
+          <a:blip r:embed="rId3">
+            <a:extLst>
+              <a:ext uri="{28A0092B-C50C-407E-A947-70E740481C1C}">
+                <a14:useLocalDpi xmlns:a14="http://schemas.microsoft.com/office/drawing/2010/main" val="0"/>
+              </a:ext>
+            </a:extLst>
+          </a:blip>
+          <a:srcRect/>
+          <a:stretch>
+            <a:fillRect/>
+          </a:stretch>
+        </p:blipFill>
+        <p:spPr bwMode="auto">
+          <a:xfrm>
+            <a:off x="858996" y="987421"/>
+            <a:ext cx="7426006" cy="5569504"/>
+          </a:xfrm>
+          <a:prstGeom prst="rect">
+            <a:avLst/>
+          </a:prstGeom>
+          <a:noFill/>
+          <a:extLst>
+            <a:ext uri="{909E8E84-426E-40DD-AFC4-6F175D3DCCD1}">
+              <a14:hiddenFill xmlns:a14="http://schemas.microsoft.com/office/drawing/2010/main">
+                <a:solidFill>
+                  <a:srgbClr val="FFFFFF"/>
+                </a:solidFill>
+              </a14:hiddenFill>
+            </a:ext>
+          </a:extLst>
+        </p:spPr>
+      </p:pic>
+      <p:sp>
+        <p:nvSpPr>
+          <p:cNvPr id="32" name="제목 1">
+            <a:extLst>
+              <a:ext uri="{FF2B5EF4-FFF2-40B4-BE49-F238E27FC236}">
+                <a16:creationId xmlns:a16="http://schemas.microsoft.com/office/drawing/2014/main" id="{CEB6824C-74A4-4DC8-AFDD-5BA8F0636FF0}"/>
+              </a:ext>
+            </a:extLst>
+          </p:cNvPr>
+          <p:cNvSpPr txBox="1">
+            <a:spLocks/>
+          </p:cNvSpPr>
+          <p:nvPr/>
+        </p:nvSpPr>
+        <p:spPr>
+          <a:xfrm>
+            <a:off x="116681" y="-4"/>
+            <a:ext cx="8910637" cy="987425"/>
+          </a:xfrm>
+          <a:prstGeom prst="rect">
+            <a:avLst/>
+          </a:prstGeom>
+          <a:effectLst>
+            <a:outerShdw blurRad="50800" dist="38100" dir="2700000" algn="tl" rotWithShape="0">
+              <a:srgbClr val="000000">
+                <a:alpha val="40000"/>
+              </a:srgbClr>
+            </a:outerShdw>
+          </a:effectLst>
+        </p:spPr>
+        <p:txBody>
+          <a:bodyPr vert="horz" lIns="91440" tIns="45720" rIns="91440" bIns="45720" rtlCol="0" anchor="ctr">
+            <a:noAutofit/>
+          </a:bodyPr>
+          <a:lstStyle>
+            <a:lvl1pPr algn="ctr" defTabSz="457200" rtl="0" eaLnBrk="1" latinLnBrk="0" hangingPunct="1">
+              <a:spcBef>
+                <a:spcPct val="0"/>
+              </a:spcBef>
+              <a:buNone/>
+              <a:defRPr sz="4000" kern="1200">
+                <a:solidFill>
+                  <a:schemeClr val="tx1"/>
+                </a:solidFill>
+                <a:latin typeface="+mj-lt"/>
+                <a:ea typeface="+mj-ea"/>
+                <a:cs typeface="+mj-cs"/>
+              </a:defRPr>
+            </a:lvl1pPr>
+          </a:lstStyle>
+          <a:p>
+            <a:pPr lvl="0"/>
+            <a:r>
+              <a:rPr lang="en-US" altLang="ko-KR" dirty="0"/>
+              <a:t>Simulation Result </a:t>
+            </a:r>
+            <a:r>
+              <a:rPr lang="en-US" altLang="ko-KR" sz="1800" dirty="0"/>
+              <a:t>terminate at 50000 episode </a:t>
+            </a:r>
+            <a:endParaRPr lang="ko-KR" altLang="en-US" sz="1800" dirty="0">
+              <a:solidFill>
+                <a:prstClr val="black"/>
+              </a:solidFill>
+            </a:endParaRPr>
+          </a:p>
+        </p:txBody>
+      </p:sp>
+    </p:spTree>
+    <p:extLst>
+      <p:ext uri="{BB962C8B-B14F-4D97-AF65-F5344CB8AC3E}">
+        <p14:creationId xmlns:p14="http://schemas.microsoft.com/office/powerpoint/2010/main" val="1216044085"/>
+      </p:ext>
+    </p:extLst>
+  </p:cSld>
+  <p:clrMapOvr>
+    <a:masterClrMapping/>
+  </p:clrMapOvr>
+</p:sld>
+</file>
+
+<file path=ppt/slides/slide21.xml><?xml version="1.0" encoding="utf-8"?>
+<p:sld xmlns:a="http://schemas.openxmlformats.org/drawingml/2006/main" xmlns:r="http://schemas.openxmlformats.org/officeDocument/2006/relationships" xmlns:p="http://schemas.openxmlformats.org/presentationml/2006/main">
+  <p:cSld>
+    <p:spTree>
+      <p:nvGrpSpPr>
+        <p:cNvPr id="1" name=""/>
+        <p:cNvGrpSpPr/>
+        <p:nvPr/>
+      </p:nvGrpSpPr>
+      <p:grpSpPr>
+        <a:xfrm>
+          <a:off x="0" y="0"/>
+          <a:ext cx="0" cy="0"/>
+          <a:chOff x="0" y="0"/>
+          <a:chExt cx="0" cy="0"/>
+        </a:xfrm>
+      </p:grpSpPr>
       <p:sp>
         <p:nvSpPr>
           <p:cNvPr id="32" name="제목 1">
@@ -13720,7 +14222,7 @@
 </p:sld>
 </file>
 
-<file path=ppt/slides/slide21.xml><?xml version="1.0" encoding="utf-8"?>
+<file path=ppt/slides/slide22.xml><?xml version="1.0" encoding="utf-8"?>
 <p:sld xmlns:a="http://schemas.openxmlformats.org/drawingml/2006/main" xmlns:r="http://schemas.openxmlformats.org/officeDocument/2006/relationships" xmlns:p="http://schemas.openxmlformats.org/presentationml/2006/main">
   <p:cSld>
     <p:spTree>
@@ -13895,7 +14397,199 @@
 </p:sld>
 </file>
 
-<file path=ppt/slides/slide22.xml><?xml version="1.0" encoding="utf-8"?>
+<file path=ppt/slides/slide23.xml><?xml version="1.0" encoding="utf-8"?>
+<p:sld xmlns:a="http://schemas.openxmlformats.org/drawingml/2006/main" xmlns:r="http://schemas.openxmlformats.org/officeDocument/2006/relationships" xmlns:p="http://schemas.openxmlformats.org/presentationml/2006/main">
+  <p:cSld>
+    <p:spTree>
+      <p:nvGrpSpPr>
+        <p:cNvPr id="1" name=""/>
+        <p:cNvGrpSpPr/>
+        <p:nvPr/>
+      </p:nvGrpSpPr>
+      <p:grpSpPr>
+        <a:xfrm>
+          <a:off x="0" y="0"/>
+          <a:ext cx="0" cy="0"/>
+          <a:chOff x="0" y="0"/>
+          <a:chExt cx="0" cy="0"/>
+        </a:xfrm>
+      </p:grpSpPr>
+      <p:pic>
+        <p:nvPicPr>
+          <p:cNvPr id="2050" name="Picture 2" descr="https://media.discordapp.net/attachments/595510803923337227/603748275836682293/5_Figure_2.png">
+            <a:extLst>
+              <a:ext uri="{FF2B5EF4-FFF2-40B4-BE49-F238E27FC236}">
+                <a16:creationId xmlns:a16="http://schemas.microsoft.com/office/drawing/2014/main" id="{723B0F6C-3A8B-4A50-874F-3E9E155BC2CC}"/>
+              </a:ext>
+            </a:extLst>
+          </p:cNvPr>
+          <p:cNvPicPr>
+            <a:picLocks noChangeAspect="1" noChangeArrowheads="1"/>
+          </p:cNvPicPr>
+          <p:nvPr/>
+        </p:nvPicPr>
+        <p:blipFill>
+          <a:blip r:embed="rId3">
+            <a:extLst>
+              <a:ext uri="{28A0092B-C50C-407E-A947-70E740481C1C}">
+                <a14:useLocalDpi xmlns:a14="http://schemas.microsoft.com/office/drawing/2010/main" val="0"/>
+              </a:ext>
+            </a:extLst>
+          </a:blip>
+          <a:srcRect/>
+          <a:stretch>
+            <a:fillRect/>
+          </a:stretch>
+        </p:blipFill>
+        <p:spPr bwMode="auto">
+          <a:xfrm>
+            <a:off x="4475583" y="2458237"/>
+            <a:ext cx="4520971" cy="3165325"/>
+          </a:xfrm>
+          <a:prstGeom prst="rect">
+            <a:avLst/>
+          </a:prstGeom>
+          <a:noFill/>
+          <a:extLst>
+            <a:ext uri="{909E8E84-426E-40DD-AFC4-6F175D3DCCD1}">
+              <a14:hiddenFill xmlns:a14="http://schemas.microsoft.com/office/drawing/2010/main">
+                <a:solidFill>
+                  <a:srgbClr val="FFFFFF"/>
+                </a:solidFill>
+              </a14:hiddenFill>
+            </a:ext>
+          </a:extLst>
+        </p:spPr>
+      </p:pic>
+      <p:sp>
+        <p:nvSpPr>
+          <p:cNvPr id="32" name="제목 1">
+            <a:extLst>
+              <a:ext uri="{FF2B5EF4-FFF2-40B4-BE49-F238E27FC236}">
+                <a16:creationId xmlns:a16="http://schemas.microsoft.com/office/drawing/2014/main" id="{CEB6824C-74A4-4DC8-AFDD-5BA8F0636FF0}"/>
+              </a:ext>
+            </a:extLst>
+          </p:cNvPr>
+          <p:cNvSpPr txBox="1">
+            <a:spLocks/>
+          </p:cNvSpPr>
+          <p:nvPr/>
+        </p:nvSpPr>
+        <p:spPr>
+          <a:xfrm>
+            <a:off x="116681" y="-4"/>
+            <a:ext cx="8910637" cy="987425"/>
+          </a:xfrm>
+          <a:prstGeom prst="rect">
+            <a:avLst/>
+          </a:prstGeom>
+          <a:effectLst>
+            <a:outerShdw blurRad="50800" dist="38100" dir="2700000" algn="tl" rotWithShape="0">
+              <a:srgbClr val="000000">
+                <a:alpha val="40000"/>
+              </a:srgbClr>
+            </a:outerShdw>
+          </a:effectLst>
+        </p:spPr>
+        <p:txBody>
+          <a:bodyPr vert="horz" lIns="91440" tIns="45720" rIns="91440" bIns="45720" rtlCol="0" anchor="ctr">
+            <a:noAutofit/>
+          </a:bodyPr>
+          <a:lstStyle>
+            <a:lvl1pPr algn="ctr" defTabSz="457200" rtl="0" eaLnBrk="1" latinLnBrk="0" hangingPunct="1">
+              <a:spcBef>
+                <a:spcPct val="0"/>
+              </a:spcBef>
+              <a:buNone/>
+              <a:defRPr sz="4000" kern="1200">
+                <a:solidFill>
+                  <a:schemeClr val="tx1"/>
+                </a:solidFill>
+                <a:latin typeface="+mj-lt"/>
+                <a:ea typeface="+mj-ea"/>
+                <a:cs typeface="+mj-cs"/>
+              </a:defRPr>
+            </a:lvl1pPr>
+          </a:lstStyle>
+          <a:p>
+            <a:pPr lvl="0"/>
+            <a:r>
+              <a:rPr lang="en-US" altLang="ko-KR" dirty="0"/>
+              <a:t>Simulation Result </a:t>
+            </a:r>
+            <a:r>
+              <a:rPr lang="en-US" altLang="ko-KR" sz="1800" dirty="0"/>
+              <a:t>terminate at 50000 episode</a:t>
+            </a:r>
+            <a:endParaRPr lang="ko-KR" altLang="en-US" sz="1800" dirty="0">
+              <a:solidFill>
+                <a:prstClr val="black"/>
+              </a:solidFill>
+            </a:endParaRPr>
+          </a:p>
+        </p:txBody>
+      </p:sp>
+      <p:pic>
+        <p:nvPicPr>
+          <p:cNvPr id="6" name="Picture 2" descr="https://media.discordapp.net/attachments/595508927953633291/603581029411979264/BSposition_control.png">
+            <a:extLst>
+              <a:ext uri="{FF2B5EF4-FFF2-40B4-BE49-F238E27FC236}">
+                <a16:creationId xmlns:a16="http://schemas.microsoft.com/office/drawing/2014/main" id="{E25A7752-73F9-4A93-9888-0BAA0770981E}"/>
+              </a:ext>
+            </a:extLst>
+          </p:cNvPr>
+          <p:cNvPicPr>
+            <a:picLocks noChangeAspect="1" noChangeArrowheads="1"/>
+          </p:cNvPicPr>
+          <p:nvPr/>
+        </p:nvPicPr>
+        <p:blipFill>
+          <a:blip r:embed="rId4">
+            <a:extLst>
+              <a:ext uri="{28A0092B-C50C-407E-A947-70E740481C1C}">
+                <a14:useLocalDpi xmlns:a14="http://schemas.microsoft.com/office/drawing/2010/main" val="0"/>
+              </a:ext>
+            </a:extLst>
+          </a:blip>
+          <a:srcRect/>
+          <a:stretch>
+            <a:fillRect/>
+          </a:stretch>
+        </p:blipFill>
+        <p:spPr bwMode="auto">
+          <a:xfrm>
+            <a:off x="243828" y="2341290"/>
+            <a:ext cx="4231757" cy="3173818"/>
+          </a:xfrm>
+          <a:prstGeom prst="rect">
+            <a:avLst/>
+          </a:prstGeom>
+          <a:noFill/>
+          <a:extLst>
+            <a:ext uri="{909E8E84-426E-40DD-AFC4-6F175D3DCCD1}">
+              <a14:hiddenFill xmlns:a14="http://schemas.microsoft.com/office/drawing/2010/main">
+                <a:solidFill>
+                  <a:srgbClr val="FFFFFF"/>
+                </a:solidFill>
+              </a14:hiddenFill>
+            </a:ext>
+          </a:extLst>
+        </p:spPr>
+      </p:pic>
+    </p:spTree>
+    <p:extLst>
+      <p:ext uri="{BB962C8B-B14F-4D97-AF65-F5344CB8AC3E}">
+        <p14:creationId xmlns:p14="http://schemas.microsoft.com/office/powerpoint/2010/main" val="286873428"/>
+      </p:ext>
+    </p:extLst>
+  </p:cSld>
+  <p:clrMapOvr>
+    <a:masterClrMapping/>
+  </p:clrMapOvr>
+</p:sld>
+</file>
+
+<file path=ppt/slides/slide24.xml><?xml version="1.0" encoding="utf-8"?>
 <p:sld xmlns:a="http://schemas.openxmlformats.org/drawingml/2006/main" xmlns:r="http://schemas.openxmlformats.org/officeDocument/2006/relationships" xmlns:p="http://schemas.openxmlformats.org/presentationml/2006/main">
   <p:cSld>
     <p:spTree>
@@ -14158,7 +14852,7 @@
 </p:sld>
 </file>
 
-<file path=ppt/slides/slide23.xml><?xml version="1.0" encoding="utf-8"?>
+<file path=ppt/slides/slide25.xml><?xml version="1.0" encoding="utf-8"?>
 <p:sld xmlns:a="http://schemas.openxmlformats.org/drawingml/2006/main" xmlns:r="http://schemas.openxmlformats.org/officeDocument/2006/relationships" xmlns:p="http://schemas.openxmlformats.org/presentationml/2006/main">
   <p:cSld>
     <p:spTree>
@@ -14233,18 +14927,9 @@
           <a:lstStyle/>
           <a:p>
             <a:r>
-              <a:rPr lang="en-US" altLang="ko-KR" dirty="0" err="1"/>
-              <a:t>Enviornment</a:t>
-            </a:r>
-            <a:r>
               <a:rPr lang="en-US" altLang="ko-KR" dirty="0"/>
-              <a:t> </a:t>
-            </a:r>
-            <a:r>
-              <a:rPr lang="ko-KR" altLang="en-US" dirty="0"/>
-              <a:t>기준</a:t>
-            </a:r>
-            <a:endParaRPr lang="en-US" altLang="ko-KR" dirty="0"/>
+              <a:t>Environment model</a:t>
+            </a:r>
           </a:p>
           <a:p>
             <a:pPr lvl="1"/>
@@ -14253,95 +14938,127 @@
               <a:t>Consider </a:t>
             </a:r>
             <a:r>
-              <a:rPr lang="en-US" altLang="ko-KR" dirty="0" err="1"/>
+              <a:rPr lang="en-US" altLang="ko-KR" dirty="0" err="1">
+                <a:solidFill>
+                  <a:srgbClr val="0000FF"/>
+                </a:solidFill>
+              </a:rPr>
               <a:t>LoS</a:t>
             </a:r>
             <a:r>
+              <a:rPr lang="en-US" altLang="ko-KR" dirty="0">
+                <a:solidFill>
+                  <a:srgbClr val="0000FF"/>
+                </a:solidFill>
+              </a:rPr>
+              <a:t>, BS Elevation, backhaul, Interference</a:t>
+            </a:r>
+          </a:p>
+          <a:p>
+            <a:pPr lvl="1"/>
+            <a:r>
               <a:rPr lang="en-US" altLang="ko-KR" dirty="0"/>
-              <a:t>, BS Elevation, backhaul, Interference</a:t>
+              <a:t>Update </a:t>
+            </a:r>
+            <a:r>
+              <a:rPr lang="en-US" altLang="ko-KR" dirty="0">
+                <a:solidFill>
+                  <a:srgbClr val="0000FF"/>
+                </a:solidFill>
+              </a:rPr>
+              <a:t>association rule</a:t>
             </a:r>
           </a:p>
           <a:p>
             <a:pPr lvl="1"/>
             <a:r>
+              <a:rPr lang="en-US" altLang="ko-KR" dirty="0">
+                <a:solidFill>
+                  <a:schemeClr val="tx1"/>
+                </a:solidFill>
+              </a:rPr>
+              <a:t>Update SNR to </a:t>
+            </a:r>
+            <a:r>
+              <a:rPr lang="en-US" altLang="ko-KR" dirty="0">
+                <a:solidFill>
+                  <a:srgbClr val="0000FF"/>
+                </a:solidFill>
+              </a:rPr>
+              <a:t>SINR</a:t>
+            </a:r>
+          </a:p>
+          <a:p>
+            <a:r>
+              <a:rPr lang="en-US" altLang="ko-KR" dirty="0">
+                <a:solidFill>
+                  <a:schemeClr val="tx1"/>
+                </a:solidFill>
+              </a:rPr>
+              <a:t>RL model</a:t>
+            </a:r>
+          </a:p>
+          <a:p>
+            <a:pPr lvl="1"/>
+            <a:r>
               <a:rPr lang="en-US" altLang="ko-KR" dirty="0"/>
-              <a:t>Update association rule</a:t>
+              <a:t>Re-design </a:t>
+            </a:r>
+            <a:r>
+              <a:rPr lang="en-US" altLang="ko-KR" dirty="0">
+                <a:solidFill>
+                  <a:srgbClr val="FF0000"/>
+                </a:solidFill>
+              </a:rPr>
+              <a:t>reward </a:t>
             </a:r>
           </a:p>
           <a:p>
             <a:pPr lvl="1"/>
             <a:r>
+              <a:rPr lang="en-US" altLang="ko-KR" dirty="0"/>
+              <a:t>Re-design </a:t>
+            </a:r>
+            <a:r>
               <a:rPr lang="en-US" altLang="ko-KR" dirty="0">
                 <a:solidFill>
+                  <a:srgbClr val="FF0000"/>
+                </a:solidFill>
+              </a:rPr>
+              <a:t>terminal condition</a:t>
+            </a:r>
+          </a:p>
+          <a:p>
+            <a:pPr lvl="1"/>
+            <a:r>
+              <a:rPr lang="en-US" altLang="ko-KR" dirty="0">
+                <a:solidFill>
                   <a:schemeClr val="tx1"/>
                 </a:solidFill>
               </a:rPr>
-              <a:t>Update SNR to SINR</a:t>
-            </a:r>
-            <a:endParaRPr lang="en-US" altLang="ko-KR" dirty="0"/>
-          </a:p>
-          <a:p>
+              <a:t>Apply other algorithms</a:t>
+            </a:r>
+          </a:p>
+          <a:p>
+            <a:pPr lvl="2"/>
             <a:r>
               <a:rPr lang="en-US" altLang="ko-KR" dirty="0">
                 <a:solidFill>
-                  <a:schemeClr val="tx1"/>
+                  <a:srgbClr val="FF0000"/>
                 </a:solidFill>
               </a:rPr>
-              <a:t>RL </a:t>
-            </a:r>
-            <a:r>
-              <a:rPr lang="ko-KR" altLang="en-US" dirty="0">
-                <a:solidFill>
-                  <a:schemeClr val="tx1"/>
+              <a:t>Actor – Critic</a:t>
+            </a:r>
+          </a:p>
+          <a:p>
+            <a:pPr lvl="2"/>
+            <a:r>
+              <a:rPr lang="en-US" altLang="ko-KR" dirty="0">
+                <a:solidFill>
+                  <a:srgbClr val="FF0000"/>
                 </a:solidFill>
               </a:rPr>
-              <a:t>기준</a:t>
-            </a:r>
-            <a:endParaRPr lang="en-US" altLang="ko-KR" dirty="0">
-              <a:solidFill>
-                <a:schemeClr val="tx1"/>
-              </a:solidFill>
-            </a:endParaRPr>
-          </a:p>
-          <a:p>
-            <a:pPr lvl="1"/>
-            <a:r>
-              <a:rPr lang="en-US" altLang="ko-KR" dirty="0"/>
-              <a:t>Re-design reward </a:t>
-            </a:r>
-          </a:p>
-          <a:p>
-            <a:pPr lvl="1"/>
-            <a:r>
-              <a:rPr lang="en-US" altLang="ko-KR" dirty="0"/>
-              <a:t>Re-design terminal condition</a:t>
-            </a:r>
-          </a:p>
-          <a:p>
-            <a:pPr lvl="1"/>
-            <a:r>
-              <a:rPr lang="en-US" altLang="ko-KR" dirty="0">
-                <a:solidFill>
-                  <a:schemeClr val="tx1"/>
-                </a:solidFill>
-              </a:rPr>
-              <a:t>Apply other algorithms – </a:t>
-            </a:r>
-            <a:r>
-              <a:rPr lang="en-US" altLang="ko-KR" dirty="0" err="1">
-                <a:solidFill>
-                  <a:schemeClr val="tx1"/>
-                </a:solidFill>
-              </a:rPr>
-              <a:t>ActorCritic</a:t>
-            </a:r>
-            <a:r>
-              <a:rPr lang="en-US" altLang="ko-KR" dirty="0">
-                <a:solidFill>
-                  <a:schemeClr val="tx1"/>
-                </a:solidFill>
-              </a:rPr>
-              <a:t>, MCTS</a:t>
+              <a:t>MCTS</a:t>
             </a:r>
           </a:p>
           <a:p>
@@ -14366,7 +15083,7 @@
 </p:sld>
 </file>
 
-<file path=ppt/slides/slide24.xml><?xml version="1.0" encoding="utf-8"?>
+<file path=ppt/slides/slide26.xml><?xml version="1.0" encoding="utf-8"?>
 <p:sld xmlns:a="http://schemas.openxmlformats.org/drawingml/2006/main" xmlns:r="http://schemas.openxmlformats.org/officeDocument/2006/relationships" xmlns:p="http://schemas.openxmlformats.org/presentationml/2006/main">
   <p:cSld>
     <p:spTree>
@@ -14463,14 +15180,14 @@
           </a:ln>
           <a:extLst>
             <a:ext uri="{909E8E84-426E-40dd-AFC4-6F175D3DCCD1}">
-              <a14:hiddenFill xmlns="" xmlns:a14="http://schemas.microsoft.com/office/drawing/2010/main">
+              <a14:hiddenFill xmlns:a14="http://schemas.microsoft.com/office/drawing/2010/main" xmlns="">
                 <a:solidFill>
                   <a:srgbClr val="FFFFFF"/>
                 </a:solidFill>
               </a14:hiddenFill>
             </a:ext>
             <a:ext uri="{91240B29-F687-4f45-9708-019B960494DF}">
-              <a14:hiddenLine xmlns="" xmlns:a14="http://schemas.microsoft.com/office/drawing/2010/main" w="9525">
+              <a14:hiddenLine xmlns:a14="http://schemas.microsoft.com/office/drawing/2010/main" xmlns="" w="9525">
                 <a:solidFill>
                   <a:srgbClr val="000000"/>
                 </a:solidFill>
@@ -14480,7 +15197,7 @@
               </a14:hiddenLine>
             </a:ext>
             <a:ext uri="{FAA26D3D-D897-4be2-8F04-BA451C77F1D7}">
-              <ma14:placeholderFlag xmlns="" xmlns:ma14="http://schemas.microsoft.com/office/mac/drawingml/2011/main" val="1"/>
+              <ma14:placeholderFlag xmlns:ma14="http://schemas.microsoft.com/office/mac/drawingml/2011/main" xmlns="" val="1"/>
             </a:ext>
           </a:extLst>
         </p:spPr>
@@ -15028,9 +15745,21 @@
           <a:p>
             <a:pPr lvl="1"/>
             <a:r>
+              <a:rPr lang="en-US" altLang="ko-KR" dirty="0">
+                <a:solidFill>
+                  <a:srgbClr val="0000FF"/>
+                </a:solidFill>
+              </a:rPr>
+              <a:t>Dense and massive </a:t>
+            </a:r>
+            <a:r>
               <a:rPr lang="en-US" altLang="ko-KR" dirty="0"/>
-              <a:t>Dense and massive deployment of BSs</a:t>
-            </a:r>
+              <a:t>deployment of BSs</a:t>
+            </a:r>
+          </a:p>
+          <a:p>
+            <a:pPr lvl="1"/>
+            <a:endParaRPr lang="en-US" altLang="ko-KR" dirty="0"/>
           </a:p>
           <a:p>
             <a:pPr lvl="1"/>
@@ -15041,10 +15770,26 @@
           </a:p>
           <a:p>
             <a:pPr lvl="1"/>
+            <a:endParaRPr lang="en-US" altLang="ko-KR" dirty="0"/>
+          </a:p>
+          <a:p>
+            <a:pPr lvl="1"/>
+            <a:r>
+              <a:rPr lang="en-US" altLang="ko-KR" dirty="0">
+                <a:solidFill>
+                  <a:srgbClr val="0000FF"/>
+                </a:solidFill>
+              </a:rPr>
+              <a:t>BS–to –UE Ratio is higher </a:t>
+            </a:r>
             <a:r>
               <a:rPr lang="en-US" altLang="ko-KR" dirty="0"/>
-              <a:t>BS–to –UE Ratio is higher than traditional cellular network</a:t>
-            </a:r>
+              <a:t>than traditional cellular network</a:t>
+            </a:r>
+          </a:p>
+          <a:p>
+            <a:pPr lvl="1"/>
+            <a:endParaRPr lang="en-US" altLang="ko-KR" dirty="0"/>
           </a:p>
           <a:p>
             <a:pPr lvl="1"/>
@@ -15053,21 +15798,45 @@
               <a:t>Due to the densification of BSs, BS have </a:t>
             </a:r>
             <a:r>
-              <a:rPr lang="en-US" altLang="ko-KR" dirty="0" err="1"/>
+              <a:rPr lang="en-US" altLang="ko-KR" dirty="0" err="1">
+                <a:solidFill>
+                  <a:srgbClr val="0000FF"/>
+                </a:solidFill>
+              </a:rPr>
               <a:t>LoS</a:t>
             </a:r>
             <a:r>
-              <a:rPr lang="en-US" altLang="ko-KR" dirty="0"/>
+              <a:rPr lang="en-US" altLang="ko-KR" dirty="0">
+                <a:solidFill>
+                  <a:srgbClr val="0000FF"/>
+                </a:solidFill>
+              </a:rPr>
               <a:t>/</a:t>
             </a:r>
             <a:r>
-              <a:rPr lang="en-US" altLang="ko-KR" dirty="0" err="1"/>
+              <a:rPr lang="en-US" altLang="ko-KR" dirty="0" err="1">
+                <a:solidFill>
+                  <a:srgbClr val="0000FF"/>
+                </a:solidFill>
+              </a:rPr>
               <a:t>NLoS</a:t>
             </a:r>
             <a:r>
-              <a:rPr lang="en-US" altLang="ko-KR" dirty="0"/>
+              <a:rPr lang="en-US" altLang="ko-KR" dirty="0">
+                <a:solidFill>
+                  <a:srgbClr val="0000FF"/>
+                </a:solidFill>
+              </a:rPr>
               <a:t> path</a:t>
             </a:r>
+          </a:p>
+          <a:p>
+            <a:pPr lvl="1"/>
+            <a:endParaRPr lang="en-US" altLang="ko-KR" dirty="0">
+              <a:solidFill>
+                <a:srgbClr val="0000FF"/>
+              </a:solidFill>
+            </a:endParaRPr>
           </a:p>
           <a:p>
             <a:pPr lvl="1"/>
@@ -15256,6 +16025,14 @@
                   </a:rPr>
                   <a:t>environment</a:t>
                 </a:r>
+              </a:p>
+              <a:p>
+                <a:pPr lvl="2"/>
+                <a:endParaRPr lang="en-US" altLang="ko-KR" dirty="0">
+                  <a:solidFill>
+                    <a:srgbClr val="FF0000"/>
+                  </a:solidFill>
+                </a:endParaRPr>
               </a:p>
               <a:p>
                 <a:pPr lvl="2"/>
@@ -15379,6 +16156,10 @@
               </a:p>
               <a:p>
                 <a:pPr lvl="2"/>
+                <a:endParaRPr lang="en-US" altLang="ko-KR" dirty="0"/>
+              </a:p>
+              <a:p>
+                <a:pPr lvl="2"/>
                 <a:r>
                   <a:rPr lang="en-US" altLang="ko-KR" dirty="0">
                     <a:solidFill>
@@ -15452,6 +16233,10 @@
                     </m:r>
                   </m:oMath>
                 </a14:m>
+                <a:endParaRPr lang="en-US" altLang="ko-KR" dirty="0"/>
+              </a:p>
+              <a:p>
+                <a:pPr lvl="2"/>
                 <a:endParaRPr lang="en-US" altLang="ko-KR" dirty="0"/>
               </a:p>
               <a:p>
@@ -15629,7 +16414,7 @@
         </p:blipFill>
         <p:spPr>
           <a:xfrm>
-            <a:off x="5784113" y="3328290"/>
+            <a:off x="6283325" y="3094374"/>
             <a:ext cx="2743200" cy="3009175"/>
           </a:xfrm>
           <a:prstGeom prst="rect">
@@ -15733,14 +16518,38 @@
             <a:pPr lvl="1"/>
             <a:r>
               <a:rPr lang="en-US" altLang="ko-KR" dirty="0"/>
-              <a:t>Update action-value function</a:t>
+              <a:t>Update </a:t>
+            </a:r>
+            <a:r>
+              <a:rPr lang="en-US" altLang="ko-KR" dirty="0">
+                <a:solidFill>
+                  <a:srgbClr val="0000FF"/>
+                </a:solidFill>
+              </a:rPr>
+              <a:t>action-value function</a:t>
             </a:r>
           </a:p>
           <a:p>
             <a:pPr lvl="1"/>
+            <a:endParaRPr lang="en-US" altLang="ko-KR" dirty="0">
+              <a:solidFill>
+                <a:srgbClr val="0000FF"/>
+              </a:solidFill>
+            </a:endParaRPr>
+          </a:p>
+          <a:p>
+            <a:pPr lvl="1"/>
             <a:r>
               <a:rPr lang="en-US" altLang="ko-KR" dirty="0"/>
-              <a:t>Choose deep neural network as non-linear function approximator</a:t>
+              <a:t>Choose deep neural network as </a:t>
+            </a:r>
+            <a:r>
+              <a:rPr lang="en-US" altLang="ko-KR" dirty="0">
+                <a:solidFill>
+                  <a:srgbClr val="0000FF"/>
+                </a:solidFill>
+              </a:rPr>
+              <a:t>non-linear function approximator</a:t>
             </a:r>
           </a:p>
           <a:p>
@@ -15753,11 +16562,29 @@
             </a:r>
           </a:p>
           <a:p>
+            <a:pPr marL="457200" lvl="1" indent="0">
+              <a:buNone/>
+            </a:pPr>
+            <a:endParaRPr lang="en-US" altLang="ko-KR" dirty="0"/>
+          </a:p>
+          <a:p>
             <a:pPr lvl="1"/>
             <a:r>
+              <a:rPr lang="en-US" altLang="ko-KR" dirty="0">
+                <a:solidFill>
+                  <a:srgbClr val="0000FF"/>
+                </a:solidFill>
+              </a:rPr>
+              <a:t>Value based </a:t>
+            </a:r>
+            <a:r>
               <a:rPr lang="en-US" altLang="ko-KR" dirty="0"/>
-              <a:t>Value based method</a:t>
-            </a:r>
+              <a:t>method</a:t>
+            </a:r>
+          </a:p>
+          <a:p>
+            <a:pPr lvl="1"/>
+            <a:endParaRPr lang="en-US" altLang="ko-KR" dirty="0"/>
           </a:p>
           <a:p>
             <a:pPr lvl="1"/>
@@ -15941,32 +16768,136 @@
             <a:r>
               <a:rPr lang="en-US" altLang="ko-KR" dirty="0">
                 <a:solidFill>
+                  <a:srgbClr val="0000FF"/>
+                </a:solidFill>
+              </a:rPr>
+              <a:t>BSs</a:t>
+            </a:r>
+            <a:r>
+              <a:rPr lang="en-US" altLang="ko-KR" dirty="0">
+                <a:solidFill>
                   <a:schemeClr val="tx1"/>
                 </a:solidFill>
               </a:rPr>
-              <a:t>BSs consume energy in proportion to the # of active BSs</a:t>
+              <a:t> </a:t>
+            </a:r>
+            <a:r>
+              <a:rPr lang="en-US" altLang="ko-KR" dirty="0">
+                <a:solidFill>
+                  <a:srgbClr val="FF0000"/>
+                </a:solidFill>
+              </a:rPr>
+              <a:t>consume energy </a:t>
+            </a:r>
+            <a:r>
+              <a:rPr lang="en-US" altLang="ko-KR" dirty="0">
+                <a:solidFill>
+                  <a:schemeClr val="tx1"/>
+                </a:solidFill>
+              </a:rPr>
+              <a:t>in proportion to the # of active BSs</a:t>
             </a:r>
           </a:p>
           <a:p>
             <a:pPr lvl="1"/>
+            <a:endParaRPr lang="en-US" altLang="ko-KR" dirty="0">
+              <a:solidFill>
+                <a:schemeClr val="tx1"/>
+              </a:solidFill>
+            </a:endParaRPr>
+          </a:p>
+          <a:p>
+            <a:pPr lvl="1"/>
             <a:r>
               <a:rPr lang="en-US" altLang="ko-KR" dirty="0">
                 <a:solidFill>
+                  <a:srgbClr val="0000FF"/>
+                </a:solidFill>
+              </a:rPr>
+              <a:t>Data rates </a:t>
+            </a:r>
+            <a:r>
+              <a:rPr lang="en-US" altLang="ko-KR" dirty="0">
+                <a:solidFill>
+                  <a:srgbClr val="FF0000"/>
+                </a:solidFill>
+              </a:rPr>
+              <a:t>increase</a:t>
+            </a:r>
+            <a:r>
+              <a:rPr lang="en-US" altLang="ko-KR" dirty="0">
+                <a:solidFill>
                   <a:schemeClr val="tx1"/>
                 </a:solidFill>
               </a:rPr>
-              <a:t>Data rate increases as  active BSs increase </a:t>
+              <a:t> as  </a:t>
+            </a:r>
+            <a:r>
+              <a:rPr lang="en-US" altLang="ko-KR" dirty="0">
+                <a:solidFill>
+                  <a:srgbClr val="0000FF"/>
+                </a:solidFill>
+              </a:rPr>
+              <a:t>active BSs </a:t>
+            </a:r>
+            <a:r>
+              <a:rPr lang="en-US" altLang="ko-KR" dirty="0">
+                <a:solidFill>
+                  <a:srgbClr val="FF0000"/>
+                </a:solidFill>
+              </a:rPr>
+              <a:t>increase</a:t>
+            </a:r>
+            <a:r>
+              <a:rPr lang="en-US" altLang="ko-KR" dirty="0">
+                <a:solidFill>
+                  <a:schemeClr val="tx1"/>
+                </a:solidFill>
+              </a:rPr>
+              <a:t> </a:t>
             </a:r>
           </a:p>
           <a:p>
             <a:pPr lvl="1"/>
+            <a:endParaRPr lang="en-US" altLang="ko-KR" dirty="0">
+              <a:solidFill>
+                <a:schemeClr val="tx1"/>
+              </a:solidFill>
+            </a:endParaRPr>
+          </a:p>
+          <a:p>
+            <a:pPr lvl="1"/>
             <a:r>
               <a:rPr lang="en-US" altLang="ko-KR" dirty="0">
                 <a:solidFill>
                   <a:schemeClr val="tx1"/>
                 </a:solidFill>
               </a:rPr>
-              <a:t>However, the densification of BSs in UDN cause stronger interference</a:t>
+              <a:t>However, </a:t>
+            </a:r>
+            <a:r>
+              <a:rPr lang="en-US" altLang="ko-KR" dirty="0">
+                <a:solidFill>
+                  <a:srgbClr val="0000FF"/>
+                </a:solidFill>
+              </a:rPr>
+              <a:t>the densification of BSs </a:t>
+            </a:r>
+            <a:r>
+              <a:rPr lang="en-US" altLang="ko-KR" dirty="0">
+                <a:solidFill>
+                  <a:schemeClr val="tx1"/>
+                </a:solidFill>
+              </a:rPr>
+              <a:t>in UDN </a:t>
+            </a:r>
+            <a:r>
+              <a:rPr lang="en-US" altLang="ko-KR" dirty="0">
+                <a:solidFill>
+                  <a:srgbClr val="FF0000"/>
+                </a:solidFill>
+              </a:rPr>
+              <a:t>cause stronger interference</a:t>
             </a:r>
           </a:p>
           <a:p>
@@ -16008,7 +16939,7 @@
             <a:r>
               <a:rPr lang="en-US" altLang="ko-KR" b="1" dirty="0">
                 <a:solidFill>
-                  <a:schemeClr val="tx1"/>
+                  <a:srgbClr val="0000FF"/>
                 </a:solidFill>
               </a:rPr>
               <a:t>optimal</a:t>
@@ -16016,7 +16947,7 @@
             <a:r>
               <a:rPr lang="ko-KR" altLang="en-US" b="1" dirty="0">
                 <a:solidFill>
-                  <a:schemeClr val="tx1"/>
+                  <a:srgbClr val="0000FF"/>
                 </a:solidFill>
               </a:rPr>
               <a:t> </a:t>
@@ -16024,14 +16955,30 @@
             <a:r>
               <a:rPr lang="en-US" altLang="ko-KR" b="1" dirty="0">
                 <a:solidFill>
+                  <a:srgbClr val="0000FF"/>
+                </a:solidFill>
+              </a:rPr>
+              <a:t>BS on/off strategy </a:t>
+            </a:r>
+            <a:r>
+              <a:rPr lang="en-US" altLang="ko-KR" b="1" dirty="0">
+                <a:solidFill>
                   <a:schemeClr val="tx1"/>
                 </a:solidFill>
               </a:rPr>
-              <a:t>BS on/off strategy in UDN using DQN algorithm</a:t>
+              <a:t>in UDN using </a:t>
+            </a:r>
+            <a:r>
+              <a:rPr lang="en-US" altLang="ko-KR" b="1" dirty="0">
+                <a:solidFill>
+                  <a:srgbClr val="0000FF"/>
+                </a:solidFill>
+              </a:rPr>
+              <a:t>DQN algorithm</a:t>
             </a:r>
             <a:endParaRPr lang="en-US" altLang="ko-KR" dirty="0">
               <a:solidFill>
-                <a:schemeClr val="tx1"/>
+                <a:srgbClr val="0000FF"/>
               </a:solidFill>
             </a:endParaRPr>
           </a:p>

</xml_diff>